<commit_message>
Visual effects and improvements to Raytracing 1 class
</commit_message>
<xml_diff>
--- a/attachments/EfeitosVisuaisVanDam.pptx
+++ b/attachments/EfeitosVisuaisVanDam.pptx
@@ -127,7 +127,7 @@
   </p:defaultTextStyle>
   <p:extLst>
     <p:ext uri="{EFAFB233-063F-42B5-8137-9DF3F51BA10A}">
-      <p15:sldGuideLst xmlns:p15="http://schemas.microsoft.com/office/powerpoint/2012/main" xmlns="">
+      <p15:sldGuideLst xmlns="" xmlns:p15="http://schemas.microsoft.com/office/powerpoint/2012/main">
         <p15:guide id="1" orient="horz" pos="1620">
           <p15:clr>
             <a:srgbClr val="A4A3A4"/>
@@ -141,7 +141,7 @@
       </p15:sldGuideLst>
     </p:ext>
     <p:ext uri="{2D200454-40CA-4A62-9FC3-DE9A4176ACB9}">
-      <p15:notesGuideLst xmlns:p15="http://schemas.microsoft.com/office/powerpoint/2012/main" xmlns="">
+      <p15:notesGuideLst xmlns="" xmlns:p15="http://schemas.microsoft.com/office/powerpoint/2012/main">
         <p15:guide id="1" orient="horz" pos="2880">
           <p15:clr>
             <a:srgbClr val="A4A3A4"/>
@@ -250,7 +250,7 @@
           <a:p>
             <a:fld id="{13AE650C-511D-4228-8FB9-927639A32E11}" type="datetimeFigureOut">
               <a:rPr lang="en-US" smtClean="0"/>
-              <a:t>12/11/2014</a:t>
+              <a:t>6/11/2015</a:t>
             </a:fld>
             <a:endParaRPr lang="en-US"/>
           </a:p>
@@ -416,7 +416,7 @@
             <a:fld id="{7538833F-B719-416D-BA20-C01B5E5FFC94}" type="datetimeFigureOut">
               <a:rPr lang="en-US" smtClean="0"/>
               <a:pPr/>
-              <a:t>12/11/2014</a:t>
+              <a:t>6/11/2015</a:t>
             </a:fld>
             <a:endParaRPr lang="en-US"/>
           </a:p>
@@ -5169,11 +5169,11 @@
   <p:clrMapOvr>
     <a:masterClrMapping/>
   </p:clrMapOvr>
-  <mc:AlternateContent xmlns:mc="http://schemas.openxmlformats.org/markup-compatibility/2006">
-    <mc:Choice xmlns:p14="http://schemas.microsoft.com/office/powerpoint/2010/main" Requires="p14">
+  <mc:AlternateContent xmlns:mc="http://schemas.openxmlformats.org/markup-compatibility/2006" xmlns:p14="http://schemas.microsoft.com/office/powerpoint/2010/main">
+    <mc:Choice Requires="p14">
       <p:transition spd="slow" p14:dur="2000" advTm="2093"/>
     </mc:Choice>
-    <mc:Fallback>
+    <mc:Fallback xmlns="">
       <p:transition spd="slow" advTm="2093"/>
     </mc:Fallback>
   </mc:AlternateContent>
@@ -18832,7 +18832,7 @@
 </file>
 
 <file path=ppt/slides/slide5.xml><?xml version="1.0" encoding="utf-8"?>
-<p:sld xmlns:a="http://schemas.openxmlformats.org/drawingml/2006/main" xmlns:r="http://schemas.openxmlformats.org/officeDocument/2006/relationships" xmlns:p="http://schemas.openxmlformats.org/presentationml/2006/main">
+<p:sld xmlns:a="http://schemas.openxmlformats.org/drawingml/2006/main" xmlns:r="http://schemas.openxmlformats.org/officeDocument/2006/relationships" xmlns:p="http://schemas.openxmlformats.org/presentationml/2006/main" show="0">
   <p:cSld>
     <p:spTree>
       <p:nvGrpSpPr>
@@ -19265,6 +19265,14 @@
   <p:clrMapOvr>
     <a:masterClrMapping/>
   </p:clrMapOvr>
+  <mc:AlternateContent xmlns:mc="http://schemas.openxmlformats.org/markup-compatibility/2006">
+    <mc:Choice xmlns:p14="http://schemas.microsoft.com/office/powerpoint/2010/main" Requires="p14">
+      <p:transition spd="slow" p14:dur="2000"/>
+    </mc:Choice>
+    <mc:Fallback>
+      <p:transition spd="slow"/>
+    </mc:Fallback>
+  </mc:AlternateContent>
   <p:timing>
     <p:tnLst>
       <p:par>

</xml_diff>